<commit_message>
Fixed various booboo typos and added Junit package
</commit_message>
<xml_diff>
--- a/Phase0/CRC Model.pptx
+++ b/Phase0/CRC Model.pptx
@@ -14403,7 +14403,7 @@
                 <a:buChar char="●"/>
               </a:pPr>
               <a:r>
-                <a:rPr lang="en" sz="1000"/>
+                <a:rPr lang="en" sz="1000" dirty="0"/>
                 <a:t>Create new Check</a:t>
               </a:r>
             </a:p>
@@ -14413,26 +14413,9 @@
                 <a:buChar char="●"/>
               </a:pPr>
               <a:r>
-                <a:rPr lang="en" sz="1000"/>
-                <a:t>Use the Items in Player's inventory</a:t>
+                <a:rPr lang="en" sz="1000" dirty="0"/>
+                <a:t>Check against Player attributes</a:t>
               </a:r>
-            </a:p>
-            <a:p>
-              <a:pPr marL="182880" indent="-121285">
-                <a:buSzPts val="1200"/>
-                <a:buChar char="●"/>
-              </a:pPr>
-              <a:r>
-                <a:rPr lang="en" sz="1000"/>
-                <a:t>Add or discard any Item</a:t>
-              </a:r>
-            </a:p>
-            <a:p>
-              <a:pPr marL="182880" indent="-121285">
-                <a:buSzPts val="1200"/>
-                <a:buChar char="●"/>
-              </a:pPr>
-              <a:endParaRPr lang="en" sz="1000"/>
             </a:p>
           </p:txBody>
         </p:sp>

</xml_diff>